<commit_message>
actual alpha pres document.
</commit_message>
<xml_diff>
--- a/documents/alpha-presentation/team-urban-science-alpha-presentation.pptx
+++ b/documents/alpha-presentation/team-urban-science-alpha-presentation.pptx
@@ -5,21 +5,20 @@
     <p:sldMasterId id="2147483648" r:id="rId1"/>
   </p:sldMasterIdLst>
   <p:notesMasterIdLst>
-    <p:notesMasterId r:id="rId11"/>
+    <p:notesMasterId r:id="rId10"/>
   </p:notesMasterIdLst>
   <p:handoutMasterIdLst>
-    <p:handoutMasterId r:id="rId12"/>
+    <p:handoutMasterId r:id="rId11"/>
   </p:handoutMasterIdLst>
   <p:sldIdLst>
-    <p:sldId id="285" r:id="rId2"/>
-    <p:sldId id="286" r:id="rId3"/>
-    <p:sldId id="258" r:id="rId4"/>
-    <p:sldId id="270" r:id="rId5"/>
-    <p:sldId id="275" r:id="rId6"/>
-    <p:sldId id="283" r:id="rId7"/>
-    <p:sldId id="281" r:id="rId8"/>
-    <p:sldId id="282" r:id="rId9"/>
-    <p:sldId id="280" r:id="rId10"/>
+    <p:sldId id="258" r:id="rId2"/>
+    <p:sldId id="270" r:id="rId3"/>
+    <p:sldId id="275" r:id="rId4"/>
+    <p:sldId id="281" r:id="rId5"/>
+    <p:sldId id="283" r:id="rId6"/>
+    <p:sldId id="282" r:id="rId7"/>
+    <p:sldId id="287" r:id="rId8"/>
+    <p:sldId id="280" r:id="rId9"/>
   </p:sldIdLst>
   <p:sldSz cx="9144000" cy="6858000" type="screen4x3"/>
   <p:notesSz cx="6858000" cy="9144000"/>
@@ -175,11 +174,7 @@
           <a:p>
             <a:r>
               <a:rPr lang="en-US" sz="1100" dirty="0" smtClean="0"/>
-              <a:t>Team </a:t>
-            </a:r>
-            <a:r>
-              <a:rPr lang="en-US" sz="1100" dirty="0" smtClean="0"/>
-              <a:t>Urban Science</a:t>
+              <a:t>Team Urban Science</a:t>
             </a:r>
             <a:endParaRPr lang="en-US" sz="1100" dirty="0"/>
           </a:p>
@@ -320,7 +315,7 @@
           <a:blip r:embed="rId2" cstate="print">
             <a:extLst>
               <a:ext uri="{28A0092B-C50C-407E-A947-70E740481C1C}">
-                <a14:useLocalDpi xmlns:a14="http://schemas.microsoft.com/office/drawing/2010/main" xmlns="" val="0"/>
+                <a14:useLocalDpi xmlns:a14="http://schemas.microsoft.com/office/drawing/2010/main" val="0"/>
               </a:ext>
             </a:extLst>
           </a:blip>
@@ -340,7 +335,7 @@
           <a:noFill/>
           <a:extLst>
             <a:ext uri="{909E8E84-426E-40DD-AFC4-6F175D3DCCD1}">
-              <a14:hiddenFill xmlns:a14="http://schemas.microsoft.com/office/drawing/2010/main" xmlns="">
+              <a14:hiddenFill xmlns:a14="http://schemas.microsoft.com/office/drawing/2010/main">
                 <a:solidFill>
                   <a:srgbClr val="FFFFFF"/>
                 </a:solidFill>
@@ -390,7 +385,7 @@
     </p:spTree>
     <p:extLst>
       <p:ext uri="{BB962C8B-B14F-4D97-AF65-F5344CB8AC3E}">
-        <p14:creationId xmlns:p14="http://schemas.microsoft.com/office/powerpoint/2010/main" xmlns="" val="195794450"/>
+        <p14:creationId xmlns:p14="http://schemas.microsoft.com/office/powerpoint/2010/main" val="195794450"/>
       </p:ext>
     </p:extLst>
   </p:cSld>
@@ -658,7 +653,7 @@
     </p:spTree>
     <p:extLst>
       <p:ext uri="{BB962C8B-B14F-4D97-AF65-F5344CB8AC3E}">
-        <p14:creationId xmlns:p14="http://schemas.microsoft.com/office/powerpoint/2010/main" xmlns="" val="1324260742"/>
+        <p14:creationId xmlns:p14="http://schemas.microsoft.com/office/powerpoint/2010/main" val="1324260742"/>
       </p:ext>
     </p:extLst>
   </p:cSld>
@@ -791,14 +786,14 @@
           <a:ln/>
           <a:extLst>
             <a:ext uri="{909E8E84-426E-40DD-AFC4-6F175D3DCCD1}">
-              <a14:hiddenFill xmlns:a14="http://schemas.microsoft.com/office/drawing/2010/main" xmlns="">
+              <a14:hiddenFill xmlns:a14="http://schemas.microsoft.com/office/drawing/2010/main">
                 <a:solidFill>
                   <a:srgbClr val="FFFFFF"/>
                 </a:solidFill>
               </a14:hiddenFill>
             </a:ext>
             <a:ext uri="{91240B29-F687-4F45-9708-019B960494DF}">
-              <a14:hiddenLine xmlns:a14="http://schemas.microsoft.com/office/drawing/2010/main" xmlns="" w="9525">
+              <a14:hiddenLine xmlns:a14="http://schemas.microsoft.com/office/drawing/2010/main" w="9525">
                 <a:solidFill>
                   <a:srgbClr val="000000"/>
                 </a:solidFill>
@@ -934,14 +929,14 @@
           <a:ln/>
           <a:extLst>
             <a:ext uri="{909E8E84-426E-40DD-AFC4-6F175D3DCCD1}">
-              <a14:hiddenFill xmlns:a14="http://schemas.microsoft.com/office/drawing/2010/main" xmlns="">
+              <a14:hiddenFill xmlns:a14="http://schemas.microsoft.com/office/drawing/2010/main">
                 <a:solidFill>
                   <a:srgbClr val="FFFFFF"/>
                 </a:solidFill>
               </a14:hiddenFill>
             </a:ext>
             <a:ext uri="{91240B29-F687-4F45-9708-019B960494DF}">
-              <a14:hiddenLine xmlns:a14="http://schemas.microsoft.com/office/drawing/2010/main" xmlns="" w="9525">
+              <a14:hiddenLine xmlns:a14="http://schemas.microsoft.com/office/drawing/2010/main" w="9525">
                 <a:solidFill>
                   <a:srgbClr val="000000"/>
                 </a:solidFill>
@@ -1077,14 +1072,14 @@
           <a:ln/>
           <a:extLst>
             <a:ext uri="{909E8E84-426E-40DD-AFC4-6F175D3DCCD1}">
-              <a14:hiddenFill xmlns:a14="http://schemas.microsoft.com/office/drawing/2010/main" xmlns="">
+              <a14:hiddenFill xmlns:a14="http://schemas.microsoft.com/office/drawing/2010/main">
                 <a:solidFill>
                   <a:srgbClr val="FFFFFF"/>
                 </a:solidFill>
               </a14:hiddenFill>
             </a:ext>
             <a:ext uri="{91240B29-F687-4F45-9708-019B960494DF}">
-              <a14:hiddenLine xmlns:a14="http://schemas.microsoft.com/office/drawing/2010/main" xmlns="" w="9525">
+              <a14:hiddenLine xmlns:a14="http://schemas.microsoft.com/office/drawing/2010/main" w="9525">
                 <a:solidFill>
                   <a:srgbClr val="000000"/>
                 </a:solidFill>
@@ -1220,14 +1215,14 @@
           <a:ln/>
           <a:extLst>
             <a:ext uri="{909E8E84-426E-40DD-AFC4-6F175D3DCCD1}">
-              <a14:hiddenFill xmlns:a14="http://schemas.microsoft.com/office/drawing/2010/main" xmlns="">
+              <a14:hiddenFill xmlns:a14="http://schemas.microsoft.com/office/drawing/2010/main">
                 <a:solidFill>
                   <a:srgbClr val="FFFFFF"/>
                 </a:solidFill>
               </a14:hiddenFill>
             </a:ext>
             <a:ext uri="{91240B29-F687-4F45-9708-019B960494DF}">
-              <a14:hiddenLine xmlns:a14="http://schemas.microsoft.com/office/drawing/2010/main" xmlns="" w="9525">
+              <a14:hiddenLine xmlns:a14="http://schemas.microsoft.com/office/drawing/2010/main" w="9525">
                 <a:solidFill>
                   <a:srgbClr val="000000"/>
                 </a:solidFill>
@@ -1343,7 +1338,7 @@
             <a:fld id="{F5F811CE-CD7E-4D81-9BCF-E58182075133}" type="slidenum">
               <a:rPr lang="en-US" sz="1300"/>
               <a:pPr eaLnBrk="1" hangingPunct="1"/>
-              <a:t>3</a:t>
+              <a:t>1</a:t>
             </a:fld>
             <a:endParaRPr lang="en-US" sz="1300"/>
           </a:p>
@@ -1382,14 +1377,14 @@
           <a:ln/>
           <a:extLst>
             <a:ext uri="{909E8E84-426E-40DD-AFC4-6F175D3DCCD1}">
-              <a14:hiddenFill xmlns:a14="http://schemas.microsoft.com/office/drawing/2010/main" xmlns="">
+              <a14:hiddenFill xmlns:a14="http://schemas.microsoft.com/office/drawing/2010/main">
                 <a:solidFill>
                   <a:srgbClr val="FFFFFF"/>
                 </a:solidFill>
               </a14:hiddenFill>
             </a:ext>
             <a:ext uri="{91240B29-F687-4F45-9708-019B960494DF}">
-              <a14:hiddenLine xmlns:a14="http://schemas.microsoft.com/office/drawing/2010/main" xmlns="" w="9525">
+              <a14:hiddenLine xmlns:a14="http://schemas.microsoft.com/office/drawing/2010/main" w="9525">
                 <a:solidFill>
                   <a:srgbClr val="000000"/>
                 </a:solidFill>
@@ -1449,14 +1444,14 @@
           <a:ln/>
           <a:extLst>
             <a:ext uri="{909E8E84-426E-40DD-AFC4-6F175D3DCCD1}">
-              <a14:hiddenFill xmlns:a14="http://schemas.microsoft.com/office/drawing/2010/main" xmlns="">
+              <a14:hiddenFill xmlns:a14="http://schemas.microsoft.com/office/drawing/2010/main">
                 <a:solidFill>
                   <a:srgbClr val="FFFFFF"/>
                 </a:solidFill>
               </a14:hiddenFill>
             </a:ext>
             <a:ext uri="{91240B29-F687-4F45-9708-019B960494DF}">
-              <a14:hiddenLine xmlns:a14="http://schemas.microsoft.com/office/drawing/2010/main" xmlns="" w="9525">
+              <a14:hiddenLine xmlns:a14="http://schemas.microsoft.com/office/drawing/2010/main" w="9525">
                 <a:solidFill>
                   <a:srgbClr val="000000"/>
                 </a:solidFill>
@@ -1592,14 +1587,14 @@
           <a:ln/>
           <a:extLst>
             <a:ext uri="{909E8E84-426E-40DD-AFC4-6F175D3DCCD1}">
-              <a14:hiddenFill xmlns:a14="http://schemas.microsoft.com/office/drawing/2010/main" xmlns="">
+              <a14:hiddenFill xmlns:a14="http://schemas.microsoft.com/office/drawing/2010/main">
                 <a:solidFill>
                   <a:srgbClr val="FFFFFF"/>
                 </a:solidFill>
               </a14:hiddenFill>
             </a:ext>
             <a:ext uri="{91240B29-F687-4F45-9708-019B960494DF}">
-              <a14:hiddenLine xmlns:a14="http://schemas.microsoft.com/office/drawing/2010/main" xmlns="" w="9525">
+              <a14:hiddenLine xmlns:a14="http://schemas.microsoft.com/office/drawing/2010/main" w="9525">
                 <a:solidFill>
                   <a:srgbClr val="000000"/>
                 </a:solidFill>
@@ -1735,14 +1730,14 @@
           <a:ln/>
           <a:extLst>
             <a:ext uri="{909E8E84-426E-40DD-AFC4-6F175D3DCCD1}">
-              <a14:hiddenFill xmlns:a14="http://schemas.microsoft.com/office/drawing/2010/main" xmlns="">
+              <a14:hiddenFill xmlns:a14="http://schemas.microsoft.com/office/drawing/2010/main">
                 <a:solidFill>
                   <a:srgbClr val="FFFFFF"/>
                 </a:solidFill>
               </a14:hiddenFill>
             </a:ext>
             <a:ext uri="{91240B29-F687-4F45-9708-019B960494DF}">
-              <a14:hiddenLine xmlns:a14="http://schemas.microsoft.com/office/drawing/2010/main" xmlns="" w="9525">
+              <a14:hiddenLine xmlns:a14="http://schemas.microsoft.com/office/drawing/2010/main" w="9525">
                 <a:solidFill>
                   <a:srgbClr val="000000"/>
                 </a:solidFill>
@@ -1878,14 +1873,14 @@
           <a:ln/>
           <a:extLst>
             <a:ext uri="{909E8E84-426E-40DD-AFC4-6F175D3DCCD1}">
-              <a14:hiddenFill xmlns:a14="http://schemas.microsoft.com/office/drawing/2010/main" xmlns="">
+              <a14:hiddenFill xmlns:a14="http://schemas.microsoft.com/office/drawing/2010/main">
                 <a:solidFill>
                   <a:srgbClr val="FFFFFF"/>
                 </a:solidFill>
               </a14:hiddenFill>
             </a:ext>
             <a:ext uri="{91240B29-F687-4F45-9708-019B960494DF}">
-              <a14:hiddenLine xmlns:a14="http://schemas.microsoft.com/office/drawing/2010/main" xmlns="" w="9525">
+              <a14:hiddenLine xmlns:a14="http://schemas.microsoft.com/office/drawing/2010/main" w="9525">
                 <a:solidFill>
                   <a:srgbClr val="000000"/>
                 </a:solidFill>
@@ -2001,7 +1996,7 @@
             <a:fld id="{278B8FAB-88DE-433B-8C16-378C226CECEE}" type="slidenum">
               <a:rPr lang="en-US" sz="1300"/>
               <a:pPr eaLnBrk="1" hangingPunct="1"/>
-              <a:t>5</a:t>
+              <a:t>3</a:t>
             </a:fld>
             <a:endParaRPr lang="en-US" sz="1300"/>
           </a:p>
@@ -2036,14 +2031,14 @@
           <a:ln/>
           <a:extLst>
             <a:ext uri="{909E8E84-426E-40DD-AFC4-6F175D3DCCD1}">
-              <a14:hiddenFill xmlns:a14="http://schemas.microsoft.com/office/drawing/2010/main" xmlns="">
+              <a14:hiddenFill xmlns:a14="http://schemas.microsoft.com/office/drawing/2010/main">
                 <a:solidFill>
                   <a:srgbClr val="FFFFFF"/>
                 </a:solidFill>
               </a14:hiddenFill>
             </a:ext>
             <a:ext uri="{91240B29-F687-4F45-9708-019B960494DF}">
-              <a14:hiddenLine xmlns:a14="http://schemas.microsoft.com/office/drawing/2010/main" xmlns="" w="9525">
+              <a14:hiddenLine xmlns:a14="http://schemas.microsoft.com/office/drawing/2010/main" w="9525">
                 <a:solidFill>
                   <a:srgbClr val="000000"/>
                 </a:solidFill>
@@ -2103,14 +2098,14 @@
           <a:ln/>
           <a:extLst>
             <a:ext uri="{909E8E84-426E-40DD-AFC4-6F175D3DCCD1}">
-              <a14:hiddenFill xmlns:a14="http://schemas.microsoft.com/office/drawing/2010/main" xmlns="">
+              <a14:hiddenFill xmlns:a14="http://schemas.microsoft.com/office/drawing/2010/main">
                 <a:solidFill>
                   <a:srgbClr val="FFFFFF"/>
                 </a:solidFill>
               </a14:hiddenFill>
             </a:ext>
             <a:ext uri="{91240B29-F687-4F45-9708-019B960494DF}">
-              <a14:hiddenLine xmlns:a14="http://schemas.microsoft.com/office/drawing/2010/main" xmlns="" w="9525">
+              <a14:hiddenLine xmlns:a14="http://schemas.microsoft.com/office/drawing/2010/main" w="9525">
                 <a:solidFill>
                   <a:srgbClr val="000000"/>
                 </a:solidFill>
@@ -2246,14 +2241,14 @@
           <a:ln/>
           <a:extLst>
             <a:ext uri="{909E8E84-426E-40DD-AFC4-6F175D3DCCD1}">
-              <a14:hiddenFill xmlns:a14="http://schemas.microsoft.com/office/drawing/2010/main" xmlns="">
+              <a14:hiddenFill xmlns:a14="http://schemas.microsoft.com/office/drawing/2010/main">
                 <a:solidFill>
                   <a:srgbClr val="FFFFFF"/>
                 </a:solidFill>
               </a14:hiddenFill>
             </a:ext>
             <a:ext uri="{91240B29-F687-4F45-9708-019B960494DF}">
-              <a14:hiddenLine xmlns:a14="http://schemas.microsoft.com/office/drawing/2010/main" xmlns="" w="9525">
+              <a14:hiddenLine xmlns:a14="http://schemas.microsoft.com/office/drawing/2010/main" w="9525">
                 <a:solidFill>
                   <a:srgbClr val="000000"/>
                 </a:solidFill>
@@ -2389,14 +2384,14 @@
           <a:ln/>
           <a:extLst>
             <a:ext uri="{909E8E84-426E-40DD-AFC4-6F175D3DCCD1}">
-              <a14:hiddenFill xmlns:a14="http://schemas.microsoft.com/office/drawing/2010/main" xmlns="">
+              <a14:hiddenFill xmlns:a14="http://schemas.microsoft.com/office/drawing/2010/main">
                 <a:solidFill>
                   <a:srgbClr val="FFFFFF"/>
                 </a:solidFill>
               </a14:hiddenFill>
             </a:ext>
             <a:ext uri="{91240B29-F687-4F45-9708-019B960494DF}">
-              <a14:hiddenLine xmlns:a14="http://schemas.microsoft.com/office/drawing/2010/main" xmlns="" w="9525">
+              <a14:hiddenLine xmlns:a14="http://schemas.microsoft.com/office/drawing/2010/main" w="9525">
                 <a:solidFill>
                   <a:srgbClr val="000000"/>
                 </a:solidFill>
@@ -2532,14 +2527,14 @@
           <a:ln/>
           <a:extLst>
             <a:ext uri="{909E8E84-426E-40DD-AFC4-6F175D3DCCD1}">
-              <a14:hiddenFill xmlns:a14="http://schemas.microsoft.com/office/drawing/2010/main" xmlns="">
+              <a14:hiddenFill xmlns:a14="http://schemas.microsoft.com/office/drawing/2010/main">
                 <a:solidFill>
                   <a:srgbClr val="FFFFFF"/>
                 </a:solidFill>
               </a14:hiddenFill>
             </a:ext>
             <a:ext uri="{91240B29-F687-4F45-9708-019B960494DF}">
-              <a14:hiddenLine xmlns:a14="http://schemas.microsoft.com/office/drawing/2010/main" xmlns="" w="9525">
+              <a14:hiddenLine xmlns:a14="http://schemas.microsoft.com/office/drawing/2010/main" w="9525">
                 <a:solidFill>
                   <a:srgbClr val="000000"/>
                 </a:solidFill>
@@ -2655,7 +2650,7 @@
             <a:fld id="{5CD8F24C-0991-4625-9FDD-BC12DF69D1C4}" type="slidenum">
               <a:rPr lang="en-US" sz="1300"/>
               <a:pPr eaLnBrk="1" hangingPunct="1"/>
-              <a:t>9</a:t>
+              <a:t>8</a:t>
             </a:fld>
             <a:endParaRPr lang="en-US" sz="1300"/>
           </a:p>
@@ -2690,14 +2685,14 @@
           <a:ln/>
           <a:extLst>
             <a:ext uri="{909E8E84-426E-40DD-AFC4-6F175D3DCCD1}">
-              <a14:hiddenFill xmlns:a14="http://schemas.microsoft.com/office/drawing/2010/main" xmlns="">
+              <a14:hiddenFill xmlns:a14="http://schemas.microsoft.com/office/drawing/2010/main">
                 <a:solidFill>
                   <a:srgbClr val="FFFFFF"/>
                 </a:solidFill>
               </a14:hiddenFill>
             </a:ext>
             <a:ext uri="{91240B29-F687-4F45-9708-019B960494DF}">
-              <a14:hiddenLine xmlns:a14="http://schemas.microsoft.com/office/drawing/2010/main" xmlns="" w="9525">
+              <a14:hiddenLine xmlns:a14="http://schemas.microsoft.com/office/drawing/2010/main" w="9525">
                 <a:solidFill>
                   <a:srgbClr val="000000"/>
                 </a:solidFill>
@@ -2978,7 +2973,7 @@
           <a:blip r:embed="rId2" cstate="print">
             <a:extLst>
               <a:ext uri="{28A0092B-C50C-407E-A947-70E740481C1C}">
-                <a14:useLocalDpi xmlns:a14="http://schemas.microsoft.com/office/drawing/2010/main" xmlns="" val="0"/>
+                <a14:useLocalDpi xmlns:a14="http://schemas.microsoft.com/office/drawing/2010/main" val="0"/>
               </a:ext>
             </a:extLst>
           </a:blip>
@@ -3002,14 +2997,14 @@
           <a:effectLst/>
           <a:extLst>
             <a:ext uri="{909E8E84-426E-40DD-AFC4-6F175D3DCCD1}">
-              <a14:hiddenFill xmlns:a14="http://schemas.microsoft.com/office/drawing/2010/main" xmlns="">
+              <a14:hiddenFill xmlns:a14="http://schemas.microsoft.com/office/drawing/2010/main">
                 <a:solidFill>
                   <a:schemeClr val="accent1"/>
                 </a:solidFill>
               </a14:hiddenFill>
             </a:ext>
             <a:ext uri="{91240B29-F687-4F45-9708-019B960494DF}">
-              <a14:hiddenLine xmlns:a14="http://schemas.microsoft.com/office/drawing/2010/main" xmlns="" w="12700" algn="ctr">
+              <a14:hiddenLine xmlns:a14="http://schemas.microsoft.com/office/drawing/2010/main" w="12700" algn="ctr">
                 <a:solidFill>
                   <a:schemeClr val="tx1"/>
                 </a:solidFill>
@@ -3019,7 +3014,7 @@
               </a14:hiddenLine>
             </a:ext>
             <a:ext uri="{AF507438-7753-43E0-B8FC-AC1667EBCBE1}">
-              <a14:hiddenEffects xmlns:a14="http://schemas.microsoft.com/office/drawing/2010/main" xmlns="">
+              <a14:hiddenEffects xmlns:a14="http://schemas.microsoft.com/office/drawing/2010/main">
                 <a:effectLst>
                   <a:outerShdw dist="35921" dir="2700000" algn="ctr" rotWithShape="0">
                     <a:schemeClr val="bg2"/>
@@ -3058,7 +3053,7 @@
             <a:blip r:embed="rId4" cstate="print">
               <a:extLst>
                 <a:ext uri="{28A0092B-C50C-407E-A947-70E740481C1C}">
-                  <a14:useLocalDpi xmlns:a14="http://schemas.microsoft.com/office/drawing/2010/main" xmlns="" val="0"/>
+                  <a14:useLocalDpi xmlns:a14="http://schemas.microsoft.com/office/drawing/2010/main" val="0"/>
                 </a:ext>
               </a:extLst>
             </a:blip>
@@ -3081,14 +3076,14 @@
             </a:ln>
             <a:extLst>
               <a:ext uri="{909E8E84-426E-40DD-AFC4-6F175D3DCCD1}">
-                <a14:hiddenFill xmlns:a14="http://schemas.microsoft.com/office/drawing/2010/main" xmlns="">
+                <a14:hiddenFill xmlns:a14="http://schemas.microsoft.com/office/drawing/2010/main">
                   <a:solidFill>
                     <a:srgbClr val="FFFFFF"/>
                   </a:solidFill>
                 </a14:hiddenFill>
               </a:ext>
               <a:ext uri="{91240B29-F687-4F45-9708-019B960494DF}">
-                <a14:hiddenLine xmlns:a14="http://schemas.microsoft.com/office/drawing/2010/main" xmlns="" w="9525">
+                <a14:hiddenLine xmlns:a14="http://schemas.microsoft.com/office/drawing/2010/main" w="9525">
                   <a:solidFill>
                     <a:srgbClr val="000000"/>
                   </a:solidFill>
@@ -3122,14 +3117,14 @@
             </a:ln>
             <a:extLst>
               <a:ext uri="{909E8E84-426E-40DD-AFC4-6F175D3DCCD1}">
-                <a14:hiddenFill xmlns:a14="http://schemas.microsoft.com/office/drawing/2010/main" xmlns="">
+                <a14:hiddenFill xmlns:a14="http://schemas.microsoft.com/office/drawing/2010/main">
                   <a:solidFill>
                     <a:srgbClr val="FFFFFF"/>
                   </a:solidFill>
                 </a14:hiddenFill>
               </a:ext>
               <a:ext uri="{91240B29-F687-4F45-9708-019B960494DF}">
-                <a14:hiddenLine xmlns:a14="http://schemas.microsoft.com/office/drawing/2010/main" xmlns="" w="9525">
+                <a14:hiddenLine xmlns:a14="http://schemas.microsoft.com/office/drawing/2010/main" w="9525">
                   <a:solidFill>
                     <a:srgbClr val="000000"/>
                   </a:solidFill>
@@ -3729,7 +3724,7 @@
     </p:spTree>
     <p:extLst>
       <p:ext uri="{BB962C8B-B14F-4D97-AF65-F5344CB8AC3E}">
-        <p14:creationId xmlns:p14="http://schemas.microsoft.com/office/powerpoint/2010/main" xmlns="" val="3495439057"/>
+        <p14:creationId xmlns:p14="http://schemas.microsoft.com/office/powerpoint/2010/main" val="3495439057"/>
       </p:ext>
     </p:extLst>
   </p:cSld>
@@ -4811,7 +4806,7 @@
           <a:blip r:embed="rId3" cstate="print">
             <a:extLst>
               <a:ext uri="{28A0092B-C50C-407E-A947-70E740481C1C}">
-                <a14:useLocalDpi xmlns:a14="http://schemas.microsoft.com/office/drawing/2010/main" xmlns="" val="0"/>
+                <a14:useLocalDpi xmlns:a14="http://schemas.microsoft.com/office/drawing/2010/main" val="0"/>
               </a:ext>
             </a:extLst>
           </a:blip>
@@ -4834,14 +4829,14 @@
           </a:ln>
           <a:extLst>
             <a:ext uri="{909E8E84-426E-40DD-AFC4-6F175D3DCCD1}">
-              <a14:hiddenFill xmlns:a14="http://schemas.microsoft.com/office/drawing/2010/main" xmlns="">
+              <a14:hiddenFill xmlns:a14="http://schemas.microsoft.com/office/drawing/2010/main">
                 <a:solidFill>
                   <a:srgbClr val="FFFFFF"/>
                 </a:solidFill>
               </a14:hiddenFill>
             </a:ext>
             <a:ext uri="{91240B29-F687-4F45-9708-019B960494DF}">
-              <a14:hiddenLine xmlns:a14="http://schemas.microsoft.com/office/drawing/2010/main" xmlns="" w="9525">
+              <a14:hiddenLine xmlns:a14="http://schemas.microsoft.com/office/drawing/2010/main" w="9525">
                 <a:solidFill>
                   <a:srgbClr val="000000"/>
                 </a:solidFill>
@@ -4948,7 +4943,7 @@
     </p:spTree>
     <p:extLst>
       <p:ext uri="{BB962C8B-B14F-4D97-AF65-F5344CB8AC3E}">
-        <p14:creationId xmlns:p14="http://schemas.microsoft.com/office/powerpoint/2010/main" xmlns="" val="2215308810"/>
+        <p14:creationId xmlns:p14="http://schemas.microsoft.com/office/powerpoint/2010/main" val="2215308810"/>
       </p:ext>
     </p:extLst>
   </p:cSld>
@@ -5311,7 +5306,7 @@
           <a:blip r:embed="rId11" cstate="print">
             <a:extLst>
               <a:ext uri="{28A0092B-C50C-407E-A947-70E740481C1C}">
-                <a14:useLocalDpi xmlns:a14="http://schemas.microsoft.com/office/drawing/2010/main" xmlns="" val="0"/>
+                <a14:useLocalDpi xmlns:a14="http://schemas.microsoft.com/office/drawing/2010/main" val="0"/>
               </a:ext>
             </a:extLst>
           </a:blip>
@@ -5331,7 +5326,7 @@
           <a:noFill/>
           <a:extLst>
             <a:ext uri="{909E8E84-426E-40DD-AFC4-6F175D3DCCD1}">
-              <a14:hiddenFill xmlns:a14="http://schemas.microsoft.com/office/drawing/2010/main" xmlns="">
+              <a14:hiddenFill xmlns:a14="http://schemas.microsoft.com/office/drawing/2010/main">
                 <a:solidFill>
                   <a:srgbClr val="FFFFFF"/>
                 </a:solidFill>
@@ -5636,12 +5631,12 @@
       </p:grpSpPr>
       <p:sp>
         <p:nvSpPr>
-          <p:cNvPr id="3074" name="Title 1"/>
-          <p:cNvSpPr>
-            <a:spLocks noGrp="1"/>
-          </p:cNvSpPr>
-          <p:nvPr>
-            <p:ph type="title"/>
+          <p:cNvPr id="3074" name="Rectangle 2"/>
+          <p:cNvSpPr>
+            <a:spLocks noGrp="1" noChangeArrowheads="1"/>
+          </p:cNvSpPr>
+          <p:nvPr>
+            <p:ph type="ctrTitle"/>
           </p:nvPr>
         </p:nvSpPr>
         <p:spPr/>
@@ -5651,202 +5646,31 @@
           <a:p>
             <a:r>
               <a:rPr lang="en-US" dirty="0" smtClean="0"/>
-              <a:t>Read Me (Delete this slide.)	</a:t>
-            </a:r>
-            <a:r>
-              <a:rPr lang="en-US" sz="2000" dirty="0" smtClean="0"/>
-              <a:t>(1 of 2)</a:t>
-            </a:r>
-          </a:p>
-        </p:txBody>
-      </p:sp>
-      <p:sp>
-        <p:nvSpPr>
-          <p:cNvPr id="3075" name="Content Placeholder 2"/>
-          <p:cNvSpPr>
-            <a:spLocks noGrp="1"/>
-          </p:cNvSpPr>
-          <p:nvPr>
-            <p:ph idx="1"/>
-          </p:nvPr>
-        </p:nvSpPr>
-        <p:spPr/>
-        <p:txBody>
-          <a:bodyPr>
-            <a:normAutofit fontScale="40000" lnSpcReduction="20000"/>
-          </a:bodyPr>
-          <a:lstStyle/>
-          <a:p>
-            <a:r>
-              <a:rPr lang="en-US" dirty="0" smtClean="0"/>
-              <a:t>Presenting</a:t>
-            </a:r>
-          </a:p>
-          <a:p>
-            <a:pPr lvl="1"/>
-            <a:r>
-              <a:rPr lang="en-US" dirty="0" smtClean="0"/>
-              <a:t>The purpose of the alpha presentation is to demonstrate the alpha version of your software in order to convince everyone that your team will be successful—that is, that your team has your project completely scoped, the specifications complete, and all risks mitigated so that you are to the point where you will be capable of implementing your project, full-featured</a:t>
-            </a:r>
-            <a:r>
-              <a:rPr lang="en-US" dirty="0"/>
-              <a:t>,</a:t>
-            </a:r>
-            <a:r>
-              <a:rPr lang="en-US" dirty="0" smtClean="0"/>
-              <a:t> and delivering it to your client on time.</a:t>
-            </a:r>
-          </a:p>
-          <a:p>
-            <a:pPr lvl="1"/>
-            <a:r>
-              <a:rPr lang="en-US" dirty="0" smtClean="0"/>
-              <a:t>The time limit for your presentation is 15 minutes, which will be strictly enforced. Practice your presentation to ensure that you will finish within the allotted time.</a:t>
-            </a:r>
-          </a:p>
-          <a:p>
-            <a:pPr lvl="1"/>
-            <a:r>
-              <a:rPr lang="en-US" dirty="0" smtClean="0"/>
-              <a:t>Plan on spending most of your presentation time demonstrating your software. </a:t>
+              <a:t>Alpha Presentation</a:t>
             </a:r>
             <a:br>
               <a:rPr lang="en-US" dirty="0" smtClean="0"/>
             </a:br>
             <a:r>
+              <a:rPr lang="en-US" dirty="0" err="1" smtClean="0"/>
+              <a:t>Infographic</a:t>
+            </a:r>
+            <a:r>
               <a:rPr lang="en-US" dirty="0" smtClean="0"/>
-              <a:t>A suggested approach is as follows.</a:t>
-            </a:r>
-          </a:p>
-          <a:p>
-            <a:pPr lvl="2"/>
-            <a:r>
-              <a:rPr lang="en-US" dirty="0" smtClean="0"/>
-              <a:t>Very Brief Review of Project Overview</a:t>
-            </a:r>
-          </a:p>
-          <a:p>
-            <a:pPr lvl="2"/>
-            <a:r>
-              <a:rPr lang="en-US" dirty="0" smtClean="0"/>
-              <a:t>Very Brief Review of System Architecture</a:t>
-            </a:r>
-          </a:p>
-          <a:p>
-            <a:pPr lvl="2"/>
-            <a:r>
-              <a:rPr lang="en-US" dirty="0" smtClean="0"/>
-              <a:t>Software Demonstration (Skipping Some or All of the Screen Shot Slides)</a:t>
-            </a:r>
-          </a:p>
-          <a:p>
-            <a:pPr lvl="2"/>
-            <a:r>
-              <a:rPr lang="en-US" dirty="0" smtClean="0"/>
-              <a:t>Brief Summary of What’s left to do?</a:t>
-            </a:r>
-          </a:p>
-          <a:p>
-            <a:pPr lvl="1"/>
-            <a:r>
-              <a:rPr lang="en-US" dirty="0" smtClean="0"/>
-              <a:t>Your software demonstration should</a:t>
-            </a:r>
-          </a:p>
-          <a:p>
-            <a:pPr lvl="2"/>
-            <a:r>
-              <a:rPr lang="en-US" dirty="0" smtClean="0"/>
-              <a:t>be rehearsed,</a:t>
-            </a:r>
-          </a:p>
-          <a:p>
-            <a:pPr lvl="2"/>
-            <a:r>
-              <a:rPr lang="en-US" dirty="0" smtClean="0"/>
-              <a:t>flow, and</a:t>
-            </a:r>
-          </a:p>
-          <a:p>
-            <a:pPr lvl="2"/>
-            <a:r>
-              <a:rPr lang="en-US" dirty="0" smtClean="0"/>
-              <a:t>demonstrate the main features of your software, possibly demonstrating some use cases.</a:t>
-            </a:r>
-          </a:p>
-          <a:p>
-            <a:pPr lvl="1"/>
-            <a:r>
-              <a:rPr lang="en-US" dirty="0" smtClean="0"/>
-              <a:t>All team members are required to dress business casual on the day of your presentation.</a:t>
-            </a:r>
-          </a:p>
-          <a:p>
-            <a:r>
-              <a:rPr lang="en-US" dirty="0" smtClean="0"/>
-              <a:t>Content</a:t>
-            </a:r>
-          </a:p>
-          <a:p>
-            <a:pPr lvl="1"/>
-            <a:r>
-              <a:rPr lang="en-US" dirty="0" smtClean="0"/>
-              <a:t>Do not include any company confidential information in your presentation since all presentations will be posted on the web site.</a:t>
-            </a:r>
-          </a:p>
-          <a:p>
-            <a:pPr lvl="1"/>
-            <a:r>
-              <a:rPr lang="en-US" dirty="0" smtClean="0"/>
-              <a:t>Submit your presentation to your client for approval at least two working days in advance. </a:t>
-            </a:r>
-          </a:p>
-          <a:p>
-            <a:pPr lvl="1"/>
-            <a:r>
-              <a:rPr lang="en-US" dirty="0" smtClean="0"/>
-              <a:t>Throughout the PowerPoint template, replace placeholders &lt;…&gt; with the appropriate information.</a:t>
-            </a:r>
-          </a:p>
-          <a:p>
-            <a:pPr lvl="1"/>
-            <a:r>
-              <a:rPr lang="en-US" dirty="0" smtClean="0"/>
-              <a:t>Screen Shots</a:t>
-            </a:r>
-          </a:p>
-          <a:p>
-            <a:pPr lvl="2"/>
-            <a:r>
-              <a:rPr lang="en-US" dirty="0" smtClean="0"/>
-              <a:t>Include actual screen shots (i.e., not mockups), replacing &lt;Title of Screen Shot&gt;  with an appropriate title. </a:t>
-            </a:r>
-          </a:p>
-          <a:p>
-            <a:pPr lvl="2"/>
-            <a:r>
-              <a:rPr lang="en-US" dirty="0" smtClean="0"/>
-              <a:t>You may duplicate the Screen Shot template slide as needed.</a:t>
-            </a:r>
-          </a:p>
-          <a:p>
-            <a:pPr lvl="2"/>
-            <a:r>
-              <a:rPr lang="en-US" dirty="0" smtClean="0"/>
-              <a:t>The screen shots are intended for posting on the web rather than for being used during your presentation so you may include as many screen shots as you like in this slide deck but skip many of them during your presentation by making them hidden slides.</a:t>
-            </a:r>
-            <a:endParaRPr lang="en-US" dirty="0"/>
-          </a:p>
-        </p:txBody>
-      </p:sp>
-      <p:sp>
-        <p:nvSpPr>
-          <p:cNvPr id="4" name="Date Placeholder 3"/>
+              <a:t> Generator</a:t>
+            </a:r>
+            <a:endParaRPr lang="en-US" sz="3600" dirty="0" smtClean="0"/>
+          </a:p>
+        </p:txBody>
+      </p:sp>
+      <p:sp>
+        <p:nvSpPr>
+          <p:cNvPr id="3" name="Subtitle 2"/>
           <p:cNvSpPr>
             <a:spLocks noGrp="1"/>
           </p:cNvSpPr>
           <p:nvPr>
-            <p:ph type="dt" sz="half" idx="10"/>
+            <p:ph type="subTitle" idx="1"/>
           </p:nvPr>
         </p:nvSpPr>
         <p:spPr/>
@@ -5855,70 +5679,109 @@
           <a:lstStyle/>
           <a:p>
             <a:r>
-              <a:rPr lang="en-US" smtClean="0"/>
-              <a:t>The Capstone Experience</a:t>
-            </a:r>
-            <a:endParaRPr lang="en-US"/>
-          </a:p>
-        </p:txBody>
-      </p:sp>
-      <p:sp>
-        <p:nvSpPr>
-          <p:cNvPr id="5" name="Footer Placeholder 4"/>
-          <p:cNvSpPr>
-            <a:spLocks noGrp="1"/>
-          </p:cNvSpPr>
-          <p:nvPr>
-            <p:ph type="ftr" sz="quarter" idx="11"/>
-          </p:nvPr>
-        </p:nvSpPr>
-        <p:spPr/>
-        <p:txBody>
-          <a:bodyPr/>
-          <a:lstStyle/>
-          <a:p>
-            <a:r>
-              <a:rPr lang="en-US" smtClean="0"/>
-              <a:t>Team Urban Science Alpha Presentation</a:t>
+              <a:rPr lang="en-US" sz="2400" dirty="0" smtClean="0">
+                <a:solidFill>
+                  <a:srgbClr val="18453B"/>
+                </a:solidFill>
+              </a:rPr>
+              <a:t>Team Urban Science</a:t>
+            </a:r>
+          </a:p>
+          <a:p>
+            <a:r>
+              <a:rPr lang="en-US" dirty="0" smtClean="0">
+                <a:solidFill>
+                  <a:srgbClr val="18453B"/>
+                </a:solidFill>
+              </a:rPr>
+              <a:t>Peter Chen</a:t>
+            </a:r>
+          </a:p>
+          <a:p>
+            <a:r>
+              <a:rPr lang="en-US" dirty="0" smtClean="0">
+                <a:solidFill>
+                  <a:srgbClr val="18453B"/>
+                </a:solidFill>
+              </a:rPr>
+              <a:t>Lok Cheung</a:t>
+            </a:r>
+          </a:p>
+          <a:p>
+            <a:r>
+              <a:rPr lang="en-US" dirty="0" smtClean="0">
+                <a:solidFill>
+                  <a:srgbClr val="18453B"/>
+                </a:solidFill>
+              </a:rPr>
+              <a:t>Kevin Shreve</a:t>
+            </a:r>
+          </a:p>
+          <a:p>
+            <a:r>
+              <a:rPr lang="en-US" dirty="0" smtClean="0">
+                <a:solidFill>
+                  <a:srgbClr val="18453B"/>
+                </a:solidFill>
+              </a:rPr>
+              <a:t>Louis </a:t>
+            </a:r>
+            <a:r>
+              <a:rPr lang="en-US" dirty="0" err="1" smtClean="0">
+                <a:solidFill>
+                  <a:srgbClr val="18453B"/>
+                </a:solidFill>
+              </a:rPr>
+              <a:t>Bodnar</a:t>
+            </a:r>
+            <a:endParaRPr lang="en-US" dirty="0" smtClean="0">
+              <a:solidFill>
+                <a:srgbClr val="18453B"/>
+              </a:solidFill>
+            </a:endParaRPr>
+          </a:p>
+          <a:p>
+            <a:pPr>
+              <a:spcBef>
+                <a:spcPts val="600"/>
+              </a:spcBef>
+            </a:pPr>
+            <a:r>
+              <a:rPr lang="en-US" dirty="0" smtClean="0"/>
+              <a:t>Department of Computer Science and Engineering</a:t>
+            </a:r>
+          </a:p>
+          <a:p>
+            <a:r>
+              <a:rPr lang="en-US" dirty="0" smtClean="0"/>
+              <a:t>Michigan State University</a:t>
+            </a:r>
+          </a:p>
+          <a:p>
+            <a:pPr>
+              <a:spcBef>
+                <a:spcPts val="600"/>
+              </a:spcBef>
+            </a:pPr>
+            <a:r>
+              <a:rPr lang="en-US" dirty="0" smtClean="0"/>
+              <a:t>Spring 2012</a:t>
             </a:r>
             <a:endParaRPr lang="en-US" dirty="0"/>
-          </a:p>
-        </p:txBody>
-      </p:sp>
-      <p:sp>
-        <p:nvSpPr>
-          <p:cNvPr id="6" name="Slide Number Placeholder 5"/>
-          <p:cNvSpPr>
-            <a:spLocks noGrp="1"/>
-          </p:cNvSpPr>
-          <p:nvPr>
-            <p:ph type="sldNum" sz="quarter" idx="12"/>
-          </p:nvPr>
-        </p:nvSpPr>
-        <p:spPr/>
-        <p:txBody>
-          <a:bodyPr/>
-          <a:lstStyle/>
-          <a:p>
-            <a:fld id="{B6F15528-21DE-4FAA-801E-634DDDAF4B2B}" type="slidenum">
-              <a:rPr lang="en-US" smtClean="0"/>
-              <a:pPr/>
-              <a:t>1</a:t>
-            </a:fld>
-            <a:endParaRPr lang="en-US"/>
           </a:p>
         </p:txBody>
       </p:sp>
     </p:spTree>
     <p:extLst>
       <p:ext uri="{BB962C8B-B14F-4D97-AF65-F5344CB8AC3E}">
-        <p14:creationId xmlns:p14="http://schemas.microsoft.com/office/powerpoint/2010/main" xmlns="" val="2398550897"/>
+        <p14:creationId xmlns:p14="http://schemas.microsoft.com/office/powerpoint/2010/main" val="3202802940"/>
       </p:ext>
     </p:extLst>
   </p:cSld>
   <p:clrMapOvr>
     <a:masterClrMapping/>
   </p:clrMapOvr>
+  <p:transition/>
   <p:timing>
     <p:tnLst>
       <p:par>
@@ -5948,7 +5811,7 @@
       </p:grpSpPr>
       <p:sp>
         <p:nvSpPr>
-          <p:cNvPr id="3074" name="Title 1"/>
+          <p:cNvPr id="6146" name="Title 1"/>
           <p:cNvSpPr>
             <a:spLocks noGrp="1"/>
           </p:cNvSpPr>
@@ -5962,190 +5825,20 @@
           <a:lstStyle/>
           <a:p>
             <a:r>
-              <a:rPr lang="en-US" dirty="0" smtClean="0"/>
-              <a:t>Read Me (Delete this slide.)	</a:t>
-            </a:r>
-            <a:r>
-              <a:rPr lang="en-US" sz="2000" dirty="0" smtClean="0"/>
-              <a:t>(2 of 2)</a:t>
-            </a:r>
-          </a:p>
-        </p:txBody>
-      </p:sp>
-      <p:sp>
-        <p:nvSpPr>
-          <p:cNvPr id="3075" name="Content Placeholder 2"/>
+              <a:rPr lang="en-US" smtClean="0"/>
+              <a:t>Project Overview</a:t>
+            </a:r>
+          </a:p>
+        </p:txBody>
+      </p:sp>
+      <p:sp>
+        <p:nvSpPr>
+          <p:cNvPr id="6147" name="Content Placeholder 2"/>
           <p:cNvSpPr>
             <a:spLocks noGrp="1"/>
           </p:cNvSpPr>
           <p:nvPr>
             <p:ph idx="1"/>
-          </p:nvPr>
-        </p:nvSpPr>
-        <p:spPr>
-          <a:xfrm>
-            <a:off x="457200" y="1600201"/>
-            <a:ext cx="8229600" cy="3124199"/>
-          </a:xfrm>
-        </p:spPr>
-        <p:txBody>
-          <a:bodyPr>
-            <a:normAutofit fontScale="47500" lnSpcReduction="20000"/>
-          </a:bodyPr>
-          <a:lstStyle/>
-          <a:p>
-            <a:r>
-              <a:rPr lang="en-US" dirty="0" smtClean="0"/>
-              <a:t>Required Template</a:t>
-            </a:r>
-          </a:p>
-          <a:p>
-            <a:pPr lvl="1"/>
-            <a:r>
-              <a:rPr lang="en-US" dirty="0" smtClean="0"/>
-              <a:t>Do not edit the Slide Masters.</a:t>
-            </a:r>
-          </a:p>
-          <a:p>
-            <a:pPr lvl="1"/>
-            <a:r>
-              <a:rPr lang="en-US" dirty="0" smtClean="0"/>
-              <a:t>Edit the slide center footer (Insert &gt; Header &amp; Footer), changing &lt;Team Name&gt; in the footer to your team name.</a:t>
-            </a:r>
-          </a:p>
-          <a:p>
-            <a:pPr lvl="1"/>
-            <a:r>
-              <a:rPr lang="en-US" dirty="0" smtClean="0"/>
-              <a:t>Edit the Handout Master (6 Slides Per Page) as follows.</a:t>
-            </a:r>
-          </a:p>
-          <a:p>
-            <a:pPr lvl="2"/>
-            <a:r>
-              <a:rPr lang="en-US" dirty="0" smtClean="0"/>
-              <a:t>In the left header, change &lt;Team Name&gt; to your team name.</a:t>
-            </a:r>
-          </a:p>
-          <a:p>
-            <a:pPr lvl="2"/>
-            <a:r>
-              <a:rPr lang="en-US" dirty="0" smtClean="0"/>
-              <a:t>In the right footer, change &lt;Project Title&gt; to your project title.</a:t>
-            </a:r>
-          </a:p>
-          <a:p>
-            <a:pPr lvl="1"/>
-            <a:r>
-              <a:rPr lang="en-US" dirty="0" smtClean="0"/>
-              <a:t>Do not change the organization of slides. </a:t>
-            </a:r>
-          </a:p>
-          <a:p>
-            <a:r>
-              <a:rPr lang="en-US" dirty="0"/>
-              <a:t>Submission</a:t>
-            </a:r>
-          </a:p>
-          <a:p>
-            <a:pPr lvl="1"/>
-            <a:r>
-              <a:rPr lang="en-US" dirty="0"/>
-              <a:t>Although the presentations are scheduled over the course of four meetings, all teams must be prepared to present on the first day scheduled, Monday, </a:t>
-            </a:r>
-            <a:r>
-              <a:rPr lang="en-US" dirty="0" smtClean="0"/>
-              <a:t>February 20, 2012.</a:t>
-            </a:r>
-            <a:endParaRPr lang="en-US" dirty="0"/>
-          </a:p>
-          <a:p>
-            <a:pPr lvl="1"/>
-            <a:r>
-              <a:rPr lang="en-US" dirty="0"/>
-              <a:t>The order of the presentations will be posted on our </a:t>
-            </a:r>
-            <a:r>
-              <a:rPr lang="en-US" dirty="0">
-                <a:hlinkClick r:id="rId2"/>
-              </a:rPr>
-              <a:t>All-Hands Meetings</a:t>
-            </a:r>
-            <a:r>
-              <a:rPr lang="en-US" dirty="0"/>
-              <a:t> page in the afternoon or evening of the day before the first day scheduled for presentations.</a:t>
-            </a:r>
-          </a:p>
-          <a:p>
-            <a:pPr lvl="1"/>
-            <a:r>
-              <a:rPr lang="en-US" dirty="0"/>
-              <a:t>Email your presentation to </a:t>
-            </a:r>
-            <a:r>
-              <a:rPr lang="en-US" dirty="0">
-                <a:hlinkClick r:id="rId3"/>
-              </a:rPr>
-              <a:t>Dr. D.</a:t>
-            </a:r>
-            <a:r>
-              <a:rPr lang="en-US" dirty="0"/>
-              <a:t> by midnight, Sunday, </a:t>
-            </a:r>
-            <a:r>
-              <a:rPr lang="en-US" dirty="0" smtClean="0"/>
-              <a:t>February 19, 2012.</a:t>
-            </a:r>
-            <a:endParaRPr lang="en-US" dirty="0"/>
-          </a:p>
-          <a:p>
-            <a:pPr lvl="1"/>
-            <a:r>
-              <a:rPr lang="en-US" dirty="0"/>
-              <a:t>For subject, use “Team  </a:t>
-            </a:r>
-            <a:r>
-              <a:rPr lang="en-US" dirty="0" smtClean="0"/>
-              <a:t>&lt;Team Name</a:t>
-            </a:r>
-            <a:r>
-              <a:rPr lang="en-US" dirty="0"/>
-              <a:t>&gt;: Alpha Presentation” as in “Team </a:t>
-            </a:r>
-            <a:r>
-              <a:rPr lang="en-US" dirty="0" smtClean="0"/>
-              <a:t>Boeing: </a:t>
-            </a:r>
-            <a:r>
-              <a:rPr lang="en-US" dirty="0"/>
-              <a:t>Alpha Presentation”.</a:t>
-            </a:r>
-          </a:p>
-          <a:p>
-            <a:pPr lvl="1"/>
-            <a:r>
-              <a:rPr lang="en-US" dirty="0"/>
-              <a:t>Attach the PowerPoint source file named “team-</a:t>
-            </a:r>
-            <a:r>
-              <a:rPr lang="en-US" dirty="0" smtClean="0"/>
-              <a:t>&lt;team-name</a:t>
-            </a:r>
-            <a:r>
-              <a:rPr lang="en-US" dirty="0"/>
-              <a:t>&gt;-alpha-presentation.ppt” as in “team-urban-science-alpha-presentation.ppt”.</a:t>
-            </a:r>
-          </a:p>
-        </p:txBody>
-      </p:sp>
-      <p:sp>
-        <p:nvSpPr>
-          <p:cNvPr id="4" name="Date Placeholder 3"/>
-          <p:cNvSpPr>
-            <a:spLocks noGrp="1"/>
-          </p:cNvSpPr>
-          <p:nvPr>
-            <p:ph type="dt" sz="half" idx="10"/>
           </p:nvPr>
         </p:nvSpPr>
         <p:spPr/>
@@ -6154,6 +5847,66 @@
           <a:lstStyle/>
           <a:p>
             <a:r>
+              <a:rPr lang="en-US" dirty="0" smtClean="0"/>
+              <a:t>Web </a:t>
+            </a:r>
+            <a:r>
+              <a:rPr lang="en-US" smtClean="0"/>
+              <a:t>App With </a:t>
+            </a:r>
+            <a:r>
+              <a:rPr lang="en-US" dirty="0" err="1" smtClean="0"/>
+              <a:t>Infographics</a:t>
+            </a:r>
+            <a:endParaRPr lang="en-US" dirty="0" smtClean="0"/>
+          </a:p>
+          <a:p>
+            <a:r>
+              <a:rPr lang="en-US" dirty="0" smtClean="0"/>
+              <a:t>Display Information On Vehicle Sales, Service And Lead Management </a:t>
+            </a:r>
+          </a:p>
+          <a:p>
+            <a:r>
+              <a:rPr lang="en-US" dirty="0" smtClean="0"/>
+              <a:t>Convey Information To OEM’s</a:t>
+            </a:r>
+          </a:p>
+          <a:p>
+            <a:r>
+              <a:rPr lang="en-US" dirty="0" smtClean="0"/>
+              <a:t>Building Custom Library To Generate Elements Of The </a:t>
+            </a:r>
+            <a:r>
+              <a:rPr lang="en-US" dirty="0" err="1" smtClean="0"/>
+              <a:t>Infographic</a:t>
+            </a:r>
+            <a:endParaRPr lang="en-US" dirty="0" smtClean="0"/>
+          </a:p>
+          <a:p>
+            <a:pPr>
+              <a:buNone/>
+            </a:pPr>
+            <a:endParaRPr lang="en-US" dirty="0" smtClean="0"/>
+          </a:p>
+        </p:txBody>
+      </p:sp>
+      <p:sp>
+        <p:nvSpPr>
+          <p:cNvPr id="5" name="Date Placeholder 4"/>
+          <p:cNvSpPr>
+            <a:spLocks noGrp="1"/>
+          </p:cNvSpPr>
+          <p:nvPr>
+            <p:ph type="dt" sz="half" idx="10"/>
+          </p:nvPr>
+        </p:nvSpPr>
+        <p:spPr/>
+        <p:txBody>
+          <a:bodyPr/>
+          <a:lstStyle/>
+          <a:p>
+            <a:r>
               <a:rPr lang="en-US" smtClean="0"/>
               <a:t>The Capstone Experience</a:t>
             </a:r>
@@ -6163,7 +5916,7 @@
       </p:sp>
       <p:sp>
         <p:nvSpPr>
-          <p:cNvPr id="5" name="Footer Placeholder 4"/>
+          <p:cNvPr id="6" name="Footer Placeholder 5"/>
           <p:cNvSpPr>
             <a:spLocks noGrp="1"/>
           </p:cNvSpPr>
@@ -6186,7 +5939,7 @@
       </p:sp>
       <p:sp>
         <p:nvSpPr>
-          <p:cNvPr id="6" name="Slide Number Placeholder 5"/>
+          <p:cNvPr id="16" name="Slide Number Placeholder 15"/>
           <p:cNvSpPr>
             <a:spLocks noGrp="1"/>
           </p:cNvSpPr>
@@ -6211,7 +5964,7 @@
     </p:spTree>
     <p:extLst>
       <p:ext uri="{BB962C8B-B14F-4D97-AF65-F5344CB8AC3E}">
-        <p14:creationId xmlns:p14="http://schemas.microsoft.com/office/powerpoint/2010/main" xmlns="" val="1963606111"/>
+        <p14:creationId xmlns:p14="http://schemas.microsoft.com/office/powerpoint/2010/main" val="1986912342"/>
       </p:ext>
     </p:extLst>
   </p:cSld>
@@ -6247,12 +6000,12 @@
       </p:grpSpPr>
       <p:sp>
         <p:nvSpPr>
-          <p:cNvPr id="3074" name="Rectangle 2"/>
+          <p:cNvPr id="11267" name="Rectangle 2"/>
           <p:cNvSpPr>
             <a:spLocks noGrp="1" noChangeArrowheads="1"/>
           </p:cNvSpPr>
           <p:nvPr>
-            <p:ph type="ctrTitle"/>
+            <p:ph type="title"/>
           </p:nvPr>
         </p:nvSpPr>
         <p:spPr/>
@@ -6262,31 +6015,19 @@
           <a:p>
             <a:r>
               <a:rPr lang="en-US" dirty="0" smtClean="0"/>
-              <a:t>Alpha Presentation</a:t>
-            </a:r>
-            <a:br>
-              <a:rPr lang="en-US" dirty="0" smtClean="0"/>
-            </a:br>
-            <a:r>
-              <a:rPr lang="en-US" dirty="0" err="1" smtClean="0"/>
-              <a:t>Infographic</a:t>
-            </a:r>
-            <a:r>
-              <a:rPr lang="en-US" dirty="0" smtClean="0"/>
-              <a:t> Generator</a:t>
-            </a:r>
-            <a:endParaRPr lang="en-US" sz="3600" dirty="0" smtClean="0"/>
-          </a:p>
-        </p:txBody>
-      </p:sp>
-      <p:sp>
-        <p:nvSpPr>
-          <p:cNvPr id="3" name="Subtitle 2"/>
+              <a:t>System Architecture</a:t>
+            </a:r>
+          </a:p>
+        </p:txBody>
+      </p:sp>
+      <p:sp>
+        <p:nvSpPr>
+          <p:cNvPr id="5" name="Date Placeholder 4"/>
           <p:cNvSpPr>
             <a:spLocks noGrp="1"/>
           </p:cNvSpPr>
           <p:nvPr>
-            <p:ph type="subTitle" idx="1"/>
+            <p:ph type="dt" sz="half" idx="10"/>
           </p:nvPr>
         </p:nvSpPr>
         <p:spPr/>
@@ -6295,139 +6036,96 @@
           <a:lstStyle/>
           <a:p>
             <a:r>
-              <a:rPr lang="en-US" sz="2400" dirty="0" smtClean="0">
-                <a:solidFill>
-                  <a:srgbClr val="18453B"/>
-                </a:solidFill>
-              </a:rPr>
-              <a:t>Team </a:t>
-            </a:r>
-            <a:r>
-              <a:rPr lang="en-US" sz="2400" dirty="0" smtClean="0">
-                <a:solidFill>
-                  <a:srgbClr val="18453B"/>
-                </a:solidFill>
-              </a:rPr>
-              <a:t>Urban Science</a:t>
-            </a:r>
-            <a:endParaRPr lang="en-US" sz="2400" dirty="0" smtClean="0">
-              <a:solidFill>
-                <a:srgbClr val="18453B"/>
-              </a:solidFill>
-            </a:endParaRPr>
-          </a:p>
-          <a:p>
-            <a:r>
-              <a:rPr lang="en-US" dirty="0" smtClean="0">
-                <a:solidFill>
-                  <a:srgbClr val="18453B"/>
-                </a:solidFill>
-              </a:rPr>
-              <a:t>Peter Chen</a:t>
-            </a:r>
-          </a:p>
-          <a:p>
-            <a:r>
-              <a:rPr lang="en-US" dirty="0" smtClean="0">
-                <a:solidFill>
-                  <a:srgbClr val="18453B"/>
-                </a:solidFill>
-              </a:rPr>
-              <a:t>Lok </a:t>
-            </a:r>
-            <a:r>
-              <a:rPr lang="en-US" dirty="0" smtClean="0">
-                <a:solidFill>
-                  <a:srgbClr val="18453B"/>
-                </a:solidFill>
-              </a:rPr>
-              <a:t>Cheung</a:t>
-            </a:r>
-            <a:endParaRPr lang="en-US" dirty="0" smtClean="0">
-              <a:solidFill>
-                <a:srgbClr val="18453B"/>
-              </a:solidFill>
-            </a:endParaRPr>
-          </a:p>
-          <a:p>
-            <a:r>
-              <a:rPr lang="en-US" dirty="0" smtClean="0">
-                <a:solidFill>
-                  <a:srgbClr val="18453B"/>
-                </a:solidFill>
-              </a:rPr>
-              <a:t>Kevin Shreve</a:t>
-            </a:r>
-          </a:p>
-          <a:p>
-            <a:r>
-              <a:rPr lang="en-US" dirty="0" smtClean="0">
-                <a:solidFill>
-                  <a:srgbClr val="18453B"/>
-                </a:solidFill>
-              </a:rPr>
-              <a:t>Louis </a:t>
-            </a:r>
-            <a:r>
-              <a:rPr lang="en-US" dirty="0" err="1" smtClean="0">
-                <a:solidFill>
-                  <a:srgbClr val="18453B"/>
-                </a:solidFill>
-              </a:rPr>
-              <a:t>Bodnar</a:t>
-            </a:r>
-            <a:endParaRPr lang="en-US" dirty="0" smtClean="0">
-              <a:solidFill>
-                <a:srgbClr val="18453B"/>
-              </a:solidFill>
-            </a:endParaRPr>
-          </a:p>
-          <a:p>
-            <a:pPr>
-              <a:spcBef>
-                <a:spcPts val="600"/>
-              </a:spcBef>
-            </a:pPr>
-            <a:r>
-              <a:rPr lang="en-US" dirty="0" smtClean="0"/>
-              <a:t>Department </a:t>
-            </a:r>
-            <a:r>
-              <a:rPr lang="en-US" dirty="0" smtClean="0"/>
-              <a:t>of Computer Science and Engineering</a:t>
-            </a:r>
-          </a:p>
-          <a:p>
-            <a:r>
-              <a:rPr lang="en-US" dirty="0" smtClean="0"/>
-              <a:t>Michigan State University</a:t>
-            </a:r>
-          </a:p>
-          <a:p>
-            <a:pPr>
-              <a:spcBef>
-                <a:spcPts val="600"/>
-              </a:spcBef>
-            </a:pPr>
-            <a:r>
-              <a:rPr lang="en-US" dirty="0" smtClean="0"/>
-              <a:t>Spring 2012</a:t>
+              <a:rPr lang="en-US" smtClean="0"/>
+              <a:t>The Capstone Experience</a:t>
             </a:r>
             <a:endParaRPr lang="en-US" dirty="0"/>
           </a:p>
         </p:txBody>
       </p:sp>
+      <p:sp>
+        <p:nvSpPr>
+          <p:cNvPr id="6" name="Footer Placeholder 5"/>
+          <p:cNvSpPr>
+            <a:spLocks noGrp="1"/>
+          </p:cNvSpPr>
+          <p:nvPr>
+            <p:ph type="ftr" sz="quarter" idx="11"/>
+          </p:nvPr>
+        </p:nvSpPr>
+        <p:spPr/>
+        <p:txBody>
+          <a:bodyPr/>
+          <a:lstStyle/>
+          <a:p>
+            <a:r>
+              <a:rPr lang="en-US" smtClean="0"/>
+              <a:t>Team Urban Science Alpha Presentation</a:t>
+            </a:r>
+            <a:endParaRPr lang="en-US" dirty="0"/>
+          </a:p>
+        </p:txBody>
+      </p:sp>
+      <p:sp>
+        <p:nvSpPr>
+          <p:cNvPr id="7" name="Slide Number Placeholder 6"/>
+          <p:cNvSpPr>
+            <a:spLocks noGrp="1"/>
+          </p:cNvSpPr>
+          <p:nvPr>
+            <p:ph type="sldNum" sz="quarter" idx="12"/>
+          </p:nvPr>
+        </p:nvSpPr>
+        <p:spPr/>
+        <p:txBody>
+          <a:bodyPr/>
+          <a:lstStyle/>
+          <a:p>
+            <a:fld id="{B6F15528-21DE-4FAA-801E-634DDDAF4B2B}" type="slidenum">
+              <a:rPr lang="en-US" smtClean="0"/>
+              <a:pPr/>
+              <a:t>3</a:t>
+            </a:fld>
+            <a:endParaRPr lang="en-US"/>
+          </a:p>
+        </p:txBody>
+      </p:sp>
+      <p:pic>
+        <p:nvPicPr>
+          <p:cNvPr id="1026" name="Picture 2" descr="C:\Users\Kevin\Desktop\Capstone\infographic-generator\documents\project-plan\images\Capstone_-_System_Architecture_Diagram.png"/>
+          <p:cNvPicPr>
+            <a:picLocks noChangeAspect="1" noChangeArrowheads="1"/>
+          </p:cNvPicPr>
+          <p:nvPr/>
+        </p:nvPicPr>
+        <p:blipFill>
+          <a:blip r:embed="rId3" cstate="print"/>
+          <a:srcRect/>
+          <a:stretch>
+            <a:fillRect/>
+          </a:stretch>
+        </p:blipFill>
+        <p:spPr bwMode="auto">
+          <a:xfrm>
+            <a:off x="871538" y="1771650"/>
+            <a:ext cx="7400925" cy="3714750"/>
+          </a:xfrm>
+          <a:prstGeom prst="rect">
+            <a:avLst/>
+          </a:prstGeom>
+          <a:noFill/>
+        </p:spPr>
+      </p:pic>
     </p:spTree>
     <p:extLst>
       <p:ext uri="{BB962C8B-B14F-4D97-AF65-F5344CB8AC3E}">
-        <p14:creationId xmlns:p14="http://schemas.microsoft.com/office/powerpoint/2010/main" xmlns="" val="3202802940"/>
+        <p14:creationId xmlns:p14="http://schemas.microsoft.com/office/powerpoint/2010/main" val="473144030"/>
       </p:ext>
     </p:extLst>
   </p:cSld>
   <p:clrMapOvr>
     <a:masterClrMapping/>
   </p:clrMapOvr>
-  <p:transition/>
   <p:timing>
     <p:tnLst>
       <p:par>
@@ -6457,7 +6155,7 @@
       </p:grpSpPr>
       <p:sp>
         <p:nvSpPr>
-          <p:cNvPr id="6146" name="Title 1"/>
+          <p:cNvPr id="5" name="Title 4"/>
           <p:cNvSpPr>
             <a:spLocks noGrp="1"/>
           </p:cNvSpPr>
@@ -6471,20 +6169,21 @@
           <a:lstStyle/>
           <a:p>
             <a:r>
-              <a:rPr lang="en-US" smtClean="0"/>
-              <a:t>Project Overview</a:t>
-            </a:r>
-          </a:p>
-        </p:txBody>
-      </p:sp>
-      <p:sp>
-        <p:nvSpPr>
-          <p:cNvPr id="6147" name="Content Placeholder 2"/>
+              <a:rPr lang="en-US" dirty="0" smtClean="0"/>
+              <a:t>Main Menu (Landscape)</a:t>
+            </a:r>
+            <a:endParaRPr lang="en-US" sz="1800" dirty="0"/>
+          </a:p>
+        </p:txBody>
+      </p:sp>
+      <p:sp>
+        <p:nvSpPr>
+          <p:cNvPr id="2" name="Date Placeholder 1"/>
           <p:cNvSpPr>
             <a:spLocks noGrp="1"/>
           </p:cNvSpPr>
           <p:nvPr>
-            <p:ph idx="1"/>
+            <p:ph type="dt" sz="half" idx="10"/>
           </p:nvPr>
         </p:nvSpPr>
         <p:spPr/>
@@ -6493,83 +6192,21 @@
           <a:lstStyle/>
           <a:p>
             <a:r>
-              <a:rPr lang="en-US" dirty="0" smtClean="0"/>
-              <a:t>Web </a:t>
-            </a:r>
-            <a:r>
               <a:rPr lang="en-US" smtClean="0"/>
-              <a:t>App With </a:t>
-            </a:r>
-            <a:r>
-              <a:rPr lang="en-US" dirty="0" err="1" smtClean="0"/>
-              <a:t>Infographics</a:t>
-            </a:r>
-            <a:endParaRPr lang="en-US" dirty="0" smtClean="0"/>
-          </a:p>
-          <a:p>
-            <a:r>
-              <a:rPr lang="en-US" dirty="0" smtClean="0"/>
-              <a:t>Display </a:t>
-            </a:r>
-            <a:r>
-              <a:rPr lang="en-US" dirty="0" smtClean="0"/>
-              <a:t>Information On Vehicle Sales</a:t>
-            </a:r>
-            <a:r>
-              <a:rPr lang="en-US" dirty="0" smtClean="0"/>
-              <a:t>, </a:t>
-            </a:r>
-            <a:r>
-              <a:rPr lang="en-US" dirty="0" smtClean="0"/>
-              <a:t>Service And Lead Management </a:t>
-            </a:r>
-            <a:endParaRPr lang="en-US" dirty="0" smtClean="0"/>
-          </a:p>
-          <a:p>
-            <a:r>
-              <a:rPr lang="en-US" dirty="0" smtClean="0"/>
-              <a:t>Convey I</a:t>
-            </a:r>
-            <a:r>
-              <a:rPr lang="en-US" dirty="0" smtClean="0"/>
-              <a:t>nformation To </a:t>
-            </a:r>
-            <a:r>
-              <a:rPr lang="en-US" dirty="0" smtClean="0"/>
-              <a:t>OEM’s</a:t>
-            </a:r>
-          </a:p>
-          <a:p>
-            <a:r>
-              <a:rPr lang="en-US" dirty="0" smtClean="0"/>
-              <a:t>Building </a:t>
-            </a:r>
-            <a:r>
-              <a:rPr lang="en-US" dirty="0" smtClean="0"/>
-              <a:t>Custom Library To Generate Elements Of The </a:t>
-            </a:r>
-            <a:r>
-              <a:rPr lang="en-US" dirty="0" err="1" smtClean="0"/>
-              <a:t>Infographic</a:t>
-            </a:r>
-            <a:endParaRPr lang="en-US" dirty="0" smtClean="0"/>
-          </a:p>
-          <a:p>
-            <a:pPr>
-              <a:buNone/>
-            </a:pPr>
-            <a:endParaRPr lang="en-US" dirty="0" smtClean="0"/>
-          </a:p>
-        </p:txBody>
-      </p:sp>
-      <p:sp>
-        <p:nvSpPr>
-          <p:cNvPr id="5" name="Date Placeholder 4"/>
+              <a:t>The Capstone Experience</a:t>
+            </a:r>
+            <a:endParaRPr lang="en-US"/>
+          </a:p>
+        </p:txBody>
+      </p:sp>
+      <p:sp>
+        <p:nvSpPr>
+          <p:cNvPr id="3" name="Footer Placeholder 2"/>
           <p:cNvSpPr>
             <a:spLocks noGrp="1"/>
           </p:cNvSpPr>
           <p:nvPr>
-            <p:ph type="dt" sz="half" idx="10"/>
+            <p:ph type="ftr" sz="quarter" idx="11"/>
           </p:nvPr>
         </p:nvSpPr>
         <p:spPr/>
@@ -6579,29 +6216,6 @@
           <a:p>
             <a:r>
               <a:rPr lang="en-US" smtClean="0"/>
-              <a:t>The Capstone Experience</a:t>
-            </a:r>
-            <a:endParaRPr lang="en-US"/>
-          </a:p>
-        </p:txBody>
-      </p:sp>
-      <p:sp>
-        <p:nvSpPr>
-          <p:cNvPr id="6" name="Footer Placeholder 5"/>
-          <p:cNvSpPr>
-            <a:spLocks noGrp="1"/>
-          </p:cNvSpPr>
-          <p:nvPr>
-            <p:ph type="ftr" sz="quarter" idx="11"/>
-          </p:nvPr>
-        </p:nvSpPr>
-        <p:spPr/>
-        <p:txBody>
-          <a:bodyPr/>
-          <a:lstStyle/>
-          <a:p>
-            <a:r>
-              <a:rPr lang="en-US" smtClean="0"/>
               <a:t>Team Urban Science Alpha Presentation</a:t>
             </a:r>
             <a:endParaRPr lang="en-US" dirty="0"/>
@@ -6610,7 +6224,7 @@
       </p:sp>
       <p:sp>
         <p:nvSpPr>
-          <p:cNvPr id="16" name="Slide Number Placeholder 15"/>
+          <p:cNvPr id="4" name="Slide Number Placeholder 3"/>
           <p:cNvSpPr>
             <a:spLocks noGrp="1"/>
           </p:cNvSpPr>
@@ -6632,10 +6246,40 @@
           </a:p>
         </p:txBody>
       </p:sp>
+      <p:pic>
+        <p:nvPicPr>
+          <p:cNvPr id="6" name="Picture 5"/>
+          <p:cNvPicPr>
+            <a:picLocks noChangeAspect="1"/>
+          </p:cNvPicPr>
+          <p:nvPr/>
+        </p:nvPicPr>
+        <p:blipFill>
+          <a:blip r:embed="rId2">
+            <a:extLst>
+              <a:ext uri="{28A0092B-C50C-407E-A947-70E740481C1C}">
+                <a14:useLocalDpi xmlns:a14="http://schemas.microsoft.com/office/drawing/2010/main" val="0"/>
+              </a:ext>
+            </a:extLst>
+          </a:blip>
+          <a:stretch>
+            <a:fillRect/>
+          </a:stretch>
+        </p:blipFill>
+        <p:spPr>
+          <a:xfrm>
+            <a:off x="1447800" y="1714500"/>
+            <a:ext cx="6248400" cy="4686300"/>
+          </a:xfrm>
+          <a:prstGeom prst="rect">
+            <a:avLst/>
+          </a:prstGeom>
+        </p:spPr>
+      </p:pic>
     </p:spTree>
     <p:extLst>
       <p:ext uri="{BB962C8B-B14F-4D97-AF65-F5344CB8AC3E}">
-        <p14:creationId xmlns:p14="http://schemas.microsoft.com/office/powerpoint/2010/main" xmlns="" val="1986912342"/>
+        <p14:creationId xmlns:p14="http://schemas.microsoft.com/office/powerpoint/2010/main" val="2187017251"/>
       </p:ext>
     </p:extLst>
   </p:cSld>
@@ -6671,9 +6315,9 @@
       </p:grpSpPr>
       <p:sp>
         <p:nvSpPr>
-          <p:cNvPr id="11267" name="Rectangle 2"/>
-          <p:cNvSpPr>
-            <a:spLocks noGrp="1" noChangeArrowheads="1"/>
+          <p:cNvPr id="5" name="Title 4"/>
+          <p:cNvSpPr>
+            <a:spLocks noGrp="1"/>
           </p:cNvSpPr>
           <p:nvPr>
             <p:ph type="title"/>
@@ -6686,14 +6330,15 @@
           <a:p>
             <a:r>
               <a:rPr lang="en-US" dirty="0" smtClean="0"/>
-              <a:t>System Architecture</a:t>
-            </a:r>
-          </a:p>
-        </p:txBody>
-      </p:sp>
-      <p:sp>
-        <p:nvSpPr>
-          <p:cNvPr id="5" name="Date Placeholder 4"/>
+              <a:t>Main Menu (Portrait)</a:t>
+            </a:r>
+            <a:endParaRPr lang="en-US" sz="1800" dirty="0"/>
+          </a:p>
+        </p:txBody>
+      </p:sp>
+      <p:sp>
+        <p:nvSpPr>
+          <p:cNvPr id="2" name="Date Placeholder 1"/>
           <p:cNvSpPr>
             <a:spLocks noGrp="1"/>
           </p:cNvSpPr>
@@ -6710,13 +6355,13 @@
               <a:rPr lang="en-US" smtClean="0"/>
               <a:t>The Capstone Experience</a:t>
             </a:r>
-            <a:endParaRPr lang="en-US" dirty="0"/>
-          </a:p>
-        </p:txBody>
-      </p:sp>
-      <p:sp>
-        <p:nvSpPr>
-          <p:cNvPr id="6" name="Footer Placeholder 5"/>
+            <a:endParaRPr lang="en-US"/>
+          </a:p>
+        </p:txBody>
+      </p:sp>
+      <p:sp>
+        <p:nvSpPr>
+          <p:cNvPr id="3" name="Footer Placeholder 2"/>
           <p:cNvSpPr>
             <a:spLocks noGrp="1"/>
           </p:cNvSpPr>
@@ -6739,7 +6384,7 @@
       </p:sp>
       <p:sp>
         <p:nvSpPr>
-          <p:cNvPr id="7" name="Slide Number Placeholder 6"/>
+          <p:cNvPr id="4" name="Slide Number Placeholder 3"/>
           <p:cNvSpPr>
             <a:spLocks noGrp="1"/>
           </p:cNvSpPr>
@@ -6763,34 +6408,38 @@
       </p:sp>
       <p:pic>
         <p:nvPicPr>
-          <p:cNvPr id="1026" name="Picture 2" descr="C:\Users\Kevin\Desktop\Capstone\infographic-generator\documents\project-plan\images\Capstone_-_System_Architecture_Diagram.png"/>
+          <p:cNvPr id="6" name="Picture 5"/>
           <p:cNvPicPr>
-            <a:picLocks noChangeAspect="1" noChangeArrowheads="1"/>
+            <a:picLocks noChangeAspect="1"/>
           </p:cNvPicPr>
           <p:nvPr/>
         </p:nvPicPr>
         <p:blipFill>
-          <a:blip r:embed="rId3" cstate="print"/>
-          <a:srcRect/>
+          <a:blip r:embed="rId2">
+            <a:extLst>
+              <a:ext uri="{28A0092B-C50C-407E-A947-70E740481C1C}">
+                <a14:useLocalDpi xmlns:a14="http://schemas.microsoft.com/office/drawing/2010/main" val="0"/>
+              </a:ext>
+            </a:extLst>
+          </a:blip>
           <a:stretch>
             <a:fillRect/>
           </a:stretch>
         </p:blipFill>
-        <p:spPr bwMode="auto">
+        <p:spPr>
           <a:xfrm>
-            <a:off x="871538" y="1771650"/>
-            <a:ext cx="7400925" cy="3714750"/>
+            <a:off x="2723769" y="1624584"/>
+            <a:ext cx="3696462" cy="4928616"/>
           </a:xfrm>
           <a:prstGeom prst="rect">
             <a:avLst/>
           </a:prstGeom>
-          <a:noFill/>
         </p:spPr>
       </p:pic>
     </p:spTree>
     <p:extLst>
       <p:ext uri="{BB962C8B-B14F-4D97-AF65-F5344CB8AC3E}">
-        <p14:creationId xmlns:p14="http://schemas.microsoft.com/office/powerpoint/2010/main" xmlns="" val="473144030"/>
+        <p14:creationId xmlns:p14="http://schemas.microsoft.com/office/powerpoint/2010/main" val="2785345059"/>
       </p:ext>
     </p:extLst>
   </p:cSld>
@@ -6841,7 +6490,11 @@
           <a:p>
             <a:r>
               <a:rPr lang="en-US" dirty="0" smtClean="0"/>
-              <a:t>&lt;Title of Screen Shot&gt;</a:t>
+              <a:t>Sales </a:t>
+            </a:r>
+            <a:r>
+              <a:rPr lang="en-US" dirty="0" err="1" smtClean="0"/>
+              <a:t>Infographic</a:t>
             </a:r>
             <a:endParaRPr lang="en-US" sz="1800" dirty="0"/>
           </a:p>
@@ -6917,10 +6570,40 @@
           </a:p>
         </p:txBody>
       </p:sp>
+      <p:pic>
+        <p:nvPicPr>
+          <p:cNvPr id="6" name="Picture 5"/>
+          <p:cNvPicPr>
+            <a:picLocks noChangeAspect="1"/>
+          </p:cNvPicPr>
+          <p:nvPr/>
+        </p:nvPicPr>
+        <p:blipFill>
+          <a:blip r:embed="rId2">
+            <a:extLst>
+              <a:ext uri="{28A0092B-C50C-407E-A947-70E740481C1C}">
+                <a14:useLocalDpi xmlns:a14="http://schemas.microsoft.com/office/drawing/2010/main" val="0"/>
+              </a:ext>
+            </a:extLst>
+          </a:blip>
+          <a:stretch>
+            <a:fillRect/>
+          </a:stretch>
+        </p:blipFill>
+        <p:spPr>
+          <a:xfrm>
+            <a:off x="2723769" y="1624584"/>
+            <a:ext cx="3696462" cy="4928616"/>
+          </a:xfrm>
+          <a:prstGeom prst="rect">
+            <a:avLst/>
+          </a:prstGeom>
+        </p:spPr>
+      </p:pic>
     </p:spTree>
     <p:extLst>
       <p:ext uri="{BB962C8B-B14F-4D97-AF65-F5344CB8AC3E}">
-        <p14:creationId xmlns:p14="http://schemas.microsoft.com/office/powerpoint/2010/main" xmlns="" val="2785345059"/>
+        <p14:creationId xmlns:p14="http://schemas.microsoft.com/office/powerpoint/2010/main" val="65215758"/>
       </p:ext>
     </p:extLst>
   </p:cSld>
@@ -6971,7 +6654,11 @@
           <a:p>
             <a:r>
               <a:rPr lang="en-US" dirty="0" smtClean="0"/>
-              <a:t>&lt;Title of Screen Shot&gt;</a:t>
+              <a:t>Sales </a:t>
+            </a:r>
+            <a:r>
+              <a:rPr lang="en-US" dirty="0" err="1" smtClean="0"/>
+              <a:t>Infographic</a:t>
             </a:r>
             <a:endParaRPr lang="en-US" sz="1800" dirty="0"/>
           </a:p>
@@ -7047,10 +6734,40 @@
           </a:p>
         </p:txBody>
       </p:sp>
+      <p:pic>
+        <p:nvPicPr>
+          <p:cNvPr id="7" name="Picture 6"/>
+          <p:cNvPicPr>
+            <a:picLocks noChangeAspect="1"/>
+          </p:cNvPicPr>
+          <p:nvPr/>
+        </p:nvPicPr>
+        <p:blipFill>
+          <a:blip r:embed="rId2">
+            <a:extLst>
+              <a:ext uri="{28A0092B-C50C-407E-A947-70E740481C1C}">
+                <a14:useLocalDpi xmlns:a14="http://schemas.microsoft.com/office/drawing/2010/main" val="0"/>
+              </a:ext>
+            </a:extLst>
+          </a:blip>
+          <a:stretch>
+            <a:fillRect/>
+          </a:stretch>
+        </p:blipFill>
+        <p:spPr>
+          <a:xfrm>
+            <a:off x="2723769" y="1624584"/>
+            <a:ext cx="3696462" cy="4928616"/>
+          </a:xfrm>
+          <a:prstGeom prst="rect">
+            <a:avLst/>
+          </a:prstGeom>
+        </p:spPr>
+      </p:pic>
     </p:spTree>
     <p:extLst>
       <p:ext uri="{BB962C8B-B14F-4D97-AF65-F5344CB8AC3E}">
-        <p14:creationId xmlns:p14="http://schemas.microsoft.com/office/powerpoint/2010/main" xmlns="" val="2187017251"/>
+        <p14:creationId xmlns:p14="http://schemas.microsoft.com/office/powerpoint/2010/main" val="1770436775"/>
       </p:ext>
     </p:extLst>
   </p:cSld>
@@ -7086,9 +6803,9 @@
       </p:grpSpPr>
       <p:sp>
         <p:nvSpPr>
-          <p:cNvPr id="5" name="Title 4"/>
-          <p:cNvSpPr>
-            <a:spLocks noGrp="1"/>
+          <p:cNvPr id="14339" name="Rectangle 2"/>
+          <p:cNvSpPr>
+            <a:spLocks noGrp="1" noChangeArrowheads="1"/>
           </p:cNvSpPr>
           <p:nvPr>
             <p:ph type="title"/>
@@ -7100,25 +6817,20 @@
           <a:lstStyle/>
           <a:p>
             <a:r>
-              <a:rPr lang="en-US"/>
-              <a:t>&lt;Title of Screen </a:t>
-            </a:r>
-            <a:r>
-              <a:rPr lang="en-US" smtClean="0"/>
-              <a:t>Shot&gt;</a:t>
-            </a:r>
-            <a:endParaRPr lang="en-US" sz="1800" dirty="0"/>
-          </a:p>
-        </p:txBody>
-      </p:sp>
-      <p:sp>
-        <p:nvSpPr>
-          <p:cNvPr id="2" name="Date Placeholder 1"/>
-          <p:cNvSpPr>
-            <a:spLocks noGrp="1"/>
-          </p:cNvSpPr>
-          <p:nvPr>
-            <p:ph type="dt" sz="half" idx="10"/>
+              <a:rPr lang="en-US" dirty="0" smtClean="0"/>
+              <a:t>What’s left to do?</a:t>
+            </a:r>
+          </a:p>
+        </p:txBody>
+      </p:sp>
+      <p:sp>
+        <p:nvSpPr>
+          <p:cNvPr id="14340" name="Rectangle 5"/>
+          <p:cNvSpPr>
+            <a:spLocks noGrp="1" noChangeArrowheads="1"/>
+          </p:cNvSpPr>
+          <p:nvPr>
+            <p:ph type="body" idx="1"/>
           </p:nvPr>
         </p:nvSpPr>
         <p:spPr/>
@@ -7127,6 +6839,85 @@
           <a:lstStyle/>
           <a:p>
             <a:r>
+              <a:rPr lang="en-US" dirty="0" smtClean="0"/>
+              <a:t>Swipe Gestures To Change Months</a:t>
+            </a:r>
+          </a:p>
+          <a:p>
+            <a:r>
+              <a:rPr lang="en-US" dirty="0" smtClean="0"/>
+              <a:t>Lead Management </a:t>
+            </a:r>
+            <a:r>
+              <a:rPr lang="en-US" dirty="0" err="1" smtClean="0"/>
+              <a:t>Infographic</a:t>
+            </a:r>
+            <a:endParaRPr lang="en-US" dirty="0" smtClean="0"/>
+          </a:p>
+          <a:p>
+            <a:r>
+              <a:rPr lang="en-US" dirty="0" smtClean="0"/>
+              <a:t>Service </a:t>
+            </a:r>
+            <a:r>
+              <a:rPr lang="en-US" dirty="0" err="1" smtClean="0"/>
+              <a:t>Infographic</a:t>
+            </a:r>
+            <a:endParaRPr lang="en-US" dirty="0" smtClean="0"/>
+          </a:p>
+          <a:p>
+            <a:r>
+              <a:rPr lang="en-US" dirty="0" smtClean="0"/>
+              <a:t>Make Sure Data Is Fresh </a:t>
+            </a:r>
+          </a:p>
+          <a:p>
+            <a:r>
+              <a:rPr lang="en-US" dirty="0" smtClean="0"/>
+              <a:t>Click To Bring Up Description Of Element</a:t>
+            </a:r>
+          </a:p>
+          <a:p>
+            <a:r>
+              <a:rPr lang="en-US" dirty="0" smtClean="0"/>
+              <a:t>Main Menu Link On </a:t>
+            </a:r>
+            <a:r>
+              <a:rPr lang="en-US" dirty="0" err="1" smtClean="0"/>
+              <a:t>Infographic</a:t>
+            </a:r>
+            <a:r>
+              <a:rPr lang="en-US" dirty="0" smtClean="0"/>
+              <a:t> Display Page</a:t>
+            </a:r>
+          </a:p>
+          <a:p>
+            <a:endParaRPr lang="en-US" dirty="0" smtClean="0"/>
+          </a:p>
+          <a:p>
+            <a:endParaRPr lang="en-US" dirty="0" smtClean="0"/>
+          </a:p>
+          <a:p>
+            <a:endParaRPr lang="en-US" dirty="0" smtClean="0"/>
+          </a:p>
+        </p:txBody>
+      </p:sp>
+      <p:sp>
+        <p:nvSpPr>
+          <p:cNvPr id="5" name="Date Placeholder 4"/>
+          <p:cNvSpPr>
+            <a:spLocks noGrp="1"/>
+          </p:cNvSpPr>
+          <p:nvPr>
+            <p:ph type="dt" sz="half" idx="10"/>
+          </p:nvPr>
+        </p:nvSpPr>
+        <p:spPr/>
+        <p:txBody>
+          <a:bodyPr/>
+          <a:lstStyle/>
+          <a:p>
+            <a:r>
               <a:rPr lang="en-US" smtClean="0"/>
               <a:t>The Capstone Experience</a:t>
             </a:r>
@@ -7136,7 +6927,7 @@
       </p:sp>
       <p:sp>
         <p:nvSpPr>
-          <p:cNvPr id="3" name="Footer Placeholder 2"/>
+          <p:cNvPr id="6" name="Footer Placeholder 5"/>
           <p:cNvSpPr>
             <a:spLocks noGrp="1"/>
           </p:cNvSpPr>
@@ -7159,7 +6950,7 @@
       </p:sp>
       <p:sp>
         <p:nvSpPr>
-          <p:cNvPr id="4" name="Slide Number Placeholder 3"/>
+          <p:cNvPr id="7" name="Slide Number Placeholder 6"/>
           <p:cNvSpPr>
             <a:spLocks noGrp="1"/>
           </p:cNvSpPr>
@@ -7184,209 +6975,7 @@
     </p:spTree>
     <p:extLst>
       <p:ext uri="{BB962C8B-B14F-4D97-AF65-F5344CB8AC3E}">
-        <p14:creationId xmlns:p14="http://schemas.microsoft.com/office/powerpoint/2010/main" xmlns="" val="65215758"/>
-      </p:ext>
-    </p:extLst>
-  </p:cSld>
-  <p:clrMapOvr>
-    <a:masterClrMapping/>
-  </p:clrMapOvr>
-</p:sld>
-</file>
-
-<file path=ppt/slides/slide9.xml><?xml version="1.0" encoding="utf-8"?>
-<p:sld xmlns:a="http://schemas.openxmlformats.org/drawingml/2006/main" xmlns:r="http://schemas.openxmlformats.org/officeDocument/2006/relationships" xmlns:p="http://schemas.openxmlformats.org/presentationml/2006/main">
-  <p:cSld>
-    <p:spTree>
-      <p:nvGrpSpPr>
-        <p:cNvPr id="1" name=""/>
-        <p:cNvGrpSpPr/>
-        <p:nvPr/>
-      </p:nvGrpSpPr>
-      <p:grpSpPr>
-        <a:xfrm>
-          <a:off x="0" y="0"/>
-          <a:ext cx="0" cy="0"/>
-          <a:chOff x="0" y="0"/>
-          <a:chExt cx="0" cy="0"/>
-        </a:xfrm>
-      </p:grpSpPr>
-      <p:sp>
-        <p:nvSpPr>
-          <p:cNvPr id="14339" name="Rectangle 2"/>
-          <p:cNvSpPr>
-            <a:spLocks noGrp="1" noChangeArrowheads="1"/>
-          </p:cNvSpPr>
-          <p:nvPr>
-            <p:ph type="title"/>
-          </p:nvPr>
-        </p:nvSpPr>
-        <p:spPr/>
-        <p:txBody>
-          <a:bodyPr/>
-          <a:lstStyle/>
-          <a:p>
-            <a:r>
-              <a:rPr lang="en-US" dirty="0" smtClean="0"/>
-              <a:t>What’s left to do?</a:t>
-            </a:r>
-          </a:p>
-        </p:txBody>
-      </p:sp>
-      <p:sp>
-        <p:nvSpPr>
-          <p:cNvPr id="14340" name="Rectangle 5"/>
-          <p:cNvSpPr>
-            <a:spLocks noGrp="1" noChangeArrowheads="1"/>
-          </p:cNvSpPr>
-          <p:nvPr>
-            <p:ph type="body" idx="1"/>
-          </p:nvPr>
-        </p:nvSpPr>
-        <p:spPr/>
-        <p:txBody>
-          <a:bodyPr/>
-          <a:lstStyle/>
-          <a:p>
-            <a:r>
-              <a:rPr lang="en-US" dirty="0" smtClean="0"/>
-              <a:t>Swipe Gestures To Change Months</a:t>
-            </a:r>
-            <a:endParaRPr lang="en-US" dirty="0" smtClean="0"/>
-          </a:p>
-          <a:p>
-            <a:r>
-              <a:rPr lang="en-US" dirty="0" smtClean="0"/>
-              <a:t>Lead Management </a:t>
-            </a:r>
-            <a:r>
-              <a:rPr lang="en-US" dirty="0" err="1" smtClean="0"/>
-              <a:t>Infographic</a:t>
-            </a:r>
-            <a:endParaRPr lang="en-US" dirty="0" smtClean="0"/>
-          </a:p>
-          <a:p>
-            <a:r>
-              <a:rPr lang="en-US" dirty="0" smtClean="0"/>
-              <a:t>Service </a:t>
-            </a:r>
-            <a:r>
-              <a:rPr lang="en-US" dirty="0" err="1" smtClean="0"/>
-              <a:t>Infographic</a:t>
-            </a:r>
-            <a:endParaRPr lang="en-US" dirty="0" smtClean="0"/>
-          </a:p>
-          <a:p>
-            <a:r>
-              <a:rPr lang="en-US" dirty="0" smtClean="0"/>
-              <a:t>Make Sure Data Is Fresh </a:t>
-            </a:r>
-          </a:p>
-          <a:p>
-            <a:r>
-              <a:rPr lang="en-US" dirty="0" smtClean="0"/>
-              <a:t>Click To Bring Up Description Of Element</a:t>
-            </a:r>
-          </a:p>
-          <a:p>
-            <a:r>
-              <a:rPr lang="en-US" dirty="0" smtClean="0"/>
-              <a:t>Main Menu Link On </a:t>
-            </a:r>
-            <a:r>
-              <a:rPr lang="en-US" dirty="0" err="1" smtClean="0"/>
-              <a:t>Infographic</a:t>
-            </a:r>
-            <a:r>
-              <a:rPr lang="en-US" dirty="0" smtClean="0"/>
-              <a:t> Display Page</a:t>
-            </a:r>
-          </a:p>
-          <a:p>
-            <a:endParaRPr lang="en-US" dirty="0" smtClean="0"/>
-          </a:p>
-          <a:p>
-            <a:endParaRPr lang="en-US" dirty="0" smtClean="0"/>
-          </a:p>
-          <a:p>
-            <a:endParaRPr lang="en-US" dirty="0" smtClean="0"/>
-          </a:p>
-        </p:txBody>
-      </p:sp>
-      <p:sp>
-        <p:nvSpPr>
-          <p:cNvPr id="5" name="Date Placeholder 4"/>
-          <p:cNvSpPr>
-            <a:spLocks noGrp="1"/>
-          </p:cNvSpPr>
-          <p:nvPr>
-            <p:ph type="dt" sz="half" idx="10"/>
-          </p:nvPr>
-        </p:nvSpPr>
-        <p:spPr/>
-        <p:txBody>
-          <a:bodyPr/>
-          <a:lstStyle/>
-          <a:p>
-            <a:r>
-              <a:rPr lang="en-US" smtClean="0"/>
-              <a:t>The Capstone Experience</a:t>
-            </a:r>
-            <a:endParaRPr lang="en-US"/>
-          </a:p>
-        </p:txBody>
-      </p:sp>
-      <p:sp>
-        <p:nvSpPr>
-          <p:cNvPr id="6" name="Footer Placeholder 5"/>
-          <p:cNvSpPr>
-            <a:spLocks noGrp="1"/>
-          </p:cNvSpPr>
-          <p:nvPr>
-            <p:ph type="ftr" sz="quarter" idx="11"/>
-          </p:nvPr>
-        </p:nvSpPr>
-        <p:spPr/>
-        <p:txBody>
-          <a:bodyPr/>
-          <a:lstStyle/>
-          <a:p>
-            <a:r>
-              <a:rPr lang="en-US" smtClean="0"/>
-              <a:t>Team Urban Science Alpha Presentation</a:t>
-            </a:r>
-            <a:endParaRPr lang="en-US" dirty="0"/>
-          </a:p>
-        </p:txBody>
-      </p:sp>
-      <p:sp>
-        <p:nvSpPr>
-          <p:cNvPr id="7" name="Slide Number Placeholder 6"/>
-          <p:cNvSpPr>
-            <a:spLocks noGrp="1"/>
-          </p:cNvSpPr>
-          <p:nvPr>
-            <p:ph type="sldNum" sz="quarter" idx="12"/>
-          </p:nvPr>
-        </p:nvSpPr>
-        <p:spPr/>
-        <p:txBody>
-          <a:bodyPr/>
-          <a:lstStyle/>
-          <a:p>
-            <a:fld id="{B6F15528-21DE-4FAA-801E-634DDDAF4B2B}" type="slidenum">
-              <a:rPr lang="en-US" smtClean="0"/>
-              <a:pPr/>
-              <a:t>9</a:t>
-            </a:fld>
-            <a:endParaRPr lang="en-US"/>
-          </a:p>
-        </p:txBody>
-      </p:sp>
-    </p:spTree>
-    <p:extLst>
-      <p:ext uri="{BB962C8B-B14F-4D97-AF65-F5344CB8AC3E}">
-        <p14:creationId xmlns:p14="http://schemas.microsoft.com/office/powerpoint/2010/main" xmlns="" val="3728155167"/>
+        <p14:creationId xmlns:p14="http://schemas.microsoft.com/office/powerpoint/2010/main" val="3728155167"/>
       </p:ext>
     </p:extLst>
   </p:cSld>

</xml_diff>